<commit_message>
Added Bluebox Example, Video Examples
</commit_message>
<xml_diff>
--- a/ppt/Bildverarbeitung-OpenCV.pptx
+++ b/ppt/Bildverarbeitung-OpenCV.pptx
@@ -214,7 +214,7 @@
           <a:p>
             <a:fld id="{8BF8EC03-5834-394C-AB0F-2AE587FE38B0}" type="datetimeFigureOut">
               <a:rPr lang="de-DE" smtClean="0"/>
-              <a:t>27.09.15</a:t>
+              <a:t>29.09.15</a:t>
             </a:fld>
             <a:endParaRPr lang="de-DE"/>
           </a:p>
@@ -1350,8 +1350,153 @@
             </a:pPr>
             <a:r>
               <a:rPr lang="de-DE" baseline="0" dirty="0" smtClean="0"/>
-              <a:t>Das Bild hat auch blaue Stellen</a:t>
-            </a:r>
+              <a:t>Das Bild hat auch blaue </a:t>
+            </a:r>
+            <a:r>
+              <a:rPr lang="de-DE" baseline="0" dirty="0" smtClean="0"/>
+              <a:t>Stellen</a:t>
+            </a:r>
+          </a:p>
+          <a:p>
+            <a:pPr marL="228600" indent="-228600">
+              <a:buFont typeface="+mj-lt"/>
+              <a:buAutoNum type="arabicPeriod"/>
+            </a:pPr>
+            <a:endParaRPr lang="de-DE" baseline="0" dirty="0" smtClean="0"/>
+          </a:p>
+          <a:p>
+            <a:pPr marL="228600" indent="-228600">
+              <a:buFont typeface="+mj-lt"/>
+              <a:buAutoNum type="arabicPeriod"/>
+            </a:pPr>
+            <a:endParaRPr lang="de-DE" baseline="0" dirty="0" smtClean="0"/>
+          </a:p>
+          <a:p>
+            <a:pPr marL="0" indent="0">
+              <a:buFont typeface="+mj-lt"/>
+              <a:buNone/>
+            </a:pPr>
+            <a:r>
+              <a:rPr lang="de-DE" baseline="0" dirty="0" smtClean="0"/>
+              <a:t>Demo:</a:t>
+            </a:r>
+          </a:p>
+          <a:p>
+            <a:pPr marL="0" indent="0">
+              <a:buFont typeface="+mj-lt"/>
+              <a:buNone/>
+            </a:pPr>
+            <a:endParaRPr lang="de-DE" baseline="0" dirty="0" smtClean="0"/>
+          </a:p>
+          <a:p>
+            <a:pPr marL="228600" indent="-228600">
+              <a:buFont typeface="+mj-lt"/>
+              <a:buAutoNum type="arabicPeriod"/>
+            </a:pPr>
+            <a:r>
+              <a:rPr lang="de-DE" baseline="0" dirty="0" smtClean="0"/>
+              <a:t>Versuch auf dem RGB Image</a:t>
+            </a:r>
+          </a:p>
+          <a:p>
+            <a:pPr marL="228600" indent="-228600">
+              <a:buFont typeface="+mj-lt"/>
+              <a:buAutoNum type="arabicPeriod"/>
+            </a:pPr>
+            <a:r>
+              <a:rPr lang="de-DE" baseline="0" dirty="0" smtClean="0"/>
+              <a:t>Umwandlung nach HSV, auf HUE arbeiten</a:t>
+            </a:r>
+          </a:p>
+          <a:p>
+            <a:pPr marL="228600" indent="-228600">
+              <a:buFont typeface="+mj-lt"/>
+              <a:buAutoNum type="arabicPeriod"/>
+            </a:pPr>
+            <a:r>
+              <a:rPr lang="de-DE" baseline="0" dirty="0" smtClean="0"/>
+              <a:t>Es bleibt das Problem mit den blauen Flächen auf dem Körper...</a:t>
+            </a:r>
+          </a:p>
+          <a:p>
+            <a:pPr marL="685800" lvl="1" indent="-228600">
+              <a:buFont typeface="Arial" charset="0"/>
+              <a:buChar char="•"/>
+            </a:pPr>
+            <a:r>
+              <a:rPr lang="de-DE" baseline="0" dirty="0" smtClean="0"/>
+              <a:t>Nur Pixel umwandeln die mit dem Rand verbunden sind</a:t>
+            </a:r>
+          </a:p>
+          <a:p>
+            <a:pPr marL="685800" lvl="1" indent="-228600">
+              <a:buFont typeface="Arial" charset="0"/>
+              <a:buChar char="•"/>
+            </a:pPr>
+            <a:r>
+              <a:rPr lang="de-DE" baseline="0" smtClean="0"/>
+              <a:t>Ermitteln von Inseln</a:t>
+            </a:r>
+            <a:endParaRPr lang="de-DE" baseline="0" dirty="0" smtClean="0"/>
+          </a:p>
+          <a:p>
+            <a:pPr marL="0" indent="0">
+              <a:buFont typeface="+mj-lt"/>
+              <a:buNone/>
+            </a:pPr>
+            <a:endParaRPr lang="de-DE" baseline="0" dirty="0" smtClean="0"/>
+          </a:p>
+          <a:p>
+            <a:pPr marL="0" indent="0">
+              <a:buFont typeface="+mj-lt"/>
+              <a:buNone/>
+            </a:pPr>
+            <a:endParaRPr lang="de-DE" baseline="0" dirty="0" smtClean="0"/>
+          </a:p>
+          <a:p>
+            <a:pPr marL="0" indent="0">
+              <a:buFont typeface="+mj-lt"/>
+              <a:buNone/>
+            </a:pPr>
+            <a:r>
+              <a:rPr lang="de-DE" baseline="0" dirty="0" smtClean="0"/>
+              <a:t>./</a:t>
+            </a:r>
+            <a:r>
+              <a:rPr lang="de-DE" baseline="0" dirty="0" err="1" smtClean="0"/>
+              <a:t>bluebox</a:t>
+            </a:r>
+            <a:r>
+              <a:rPr lang="de-DE" baseline="0" dirty="0" smtClean="0"/>
+              <a:t> </a:t>
+            </a:r>
+            <a:r>
+              <a:rPr lang="de-DE" baseline="0" dirty="0" err="1" smtClean="0"/>
+              <a:t>image</a:t>
+            </a:r>
+            <a:r>
+              <a:rPr lang="de-DE" baseline="0" dirty="0" smtClean="0"/>
+              <a:t>/</a:t>
+            </a:r>
+            <a:r>
+              <a:rPr lang="de-DE" baseline="0" dirty="0" err="1" smtClean="0"/>
+              <a:t>cody_head.jpg</a:t>
+            </a:r>
+            <a:endParaRPr lang="de-DE" baseline="0" dirty="0" smtClean="0"/>
+          </a:p>
+          <a:p>
+            <a:pPr marL="228600" indent="-228600">
+              <a:buFont typeface="+mj-lt"/>
+              <a:buAutoNum type="arabicPeriod"/>
+            </a:pPr>
+            <a:endParaRPr lang="de-DE" baseline="0" dirty="0" smtClean="0"/>
+          </a:p>
+          <a:p>
+            <a:pPr marL="228600" indent="-228600">
+              <a:buFont typeface="+mj-lt"/>
+              <a:buAutoNum type="arabicPeriod"/>
+            </a:pPr>
+            <a:endParaRPr lang="de-DE" baseline="0" dirty="0" smtClean="0"/>
           </a:p>
           <a:p>
             <a:endParaRPr lang="de-DE" baseline="0" dirty="0" smtClean="0"/>
@@ -2015,15 +2160,7 @@
             </a:pPr>
             <a:r>
               <a:rPr lang="de-DE" baseline="0" dirty="0" smtClean="0"/>
-              <a:t>Beim Farbbild wird über den einzelnen Pixeln ein Farbfilter verwendet. Dabei werden doppelt so viele grüne Pixel verwendet (Im Vergleich zu blau und rot). Das hat den Grund, das </a:t>
-            </a:r>
-            <a:r>
-              <a:rPr lang="de-DE" baseline="0" dirty="0" smtClean="0"/>
-              <a:t>Menschen </a:t>
-            </a:r>
-            <a:r>
-              <a:rPr lang="de-DE" baseline="0" dirty="0" smtClean="0"/>
-              <a:t>Grüntöne besser unterscheiden können.</a:t>
+              <a:t>Beim Farbbild wird über den einzelnen Pixeln ein Farbfilter verwendet. Dabei werden doppelt so viele grüne Pixel verwendet (Im Vergleich zu blau und rot). Das hat den Grund, das Menschen Grüntöne besser unterscheiden können.</a:t>
             </a:r>
             <a:br>
               <a:rPr lang="de-DE" baseline="0" dirty="0" smtClean="0"/>
@@ -3258,7 +3395,7 @@
           <a:p>
             <a:fld id="{F1685586-B5EA-E847-B070-B0C7B53D662E}" type="datetimeFigureOut">
               <a:rPr lang="de-DE" smtClean="0"/>
-              <a:t>27.09.15</a:t>
+              <a:t>29.09.15</a:t>
             </a:fld>
             <a:endParaRPr lang="de-DE"/>
           </a:p>
@@ -3428,7 +3565,7 @@
           <a:p>
             <a:fld id="{F1685586-B5EA-E847-B070-B0C7B53D662E}" type="datetimeFigureOut">
               <a:rPr lang="de-DE" smtClean="0"/>
-              <a:t>27.09.15</a:t>
+              <a:t>29.09.15</a:t>
             </a:fld>
             <a:endParaRPr lang="de-DE"/>
           </a:p>
@@ -3608,7 +3745,7 @@
           <a:p>
             <a:fld id="{F1685586-B5EA-E847-B070-B0C7B53D662E}" type="datetimeFigureOut">
               <a:rPr lang="de-DE" smtClean="0"/>
-              <a:t>27.09.15</a:t>
+              <a:t>29.09.15</a:t>
             </a:fld>
             <a:endParaRPr lang="de-DE"/>
           </a:p>
@@ -3778,7 +3915,7 @@
           <a:p>
             <a:fld id="{F1685586-B5EA-E847-B070-B0C7B53D662E}" type="datetimeFigureOut">
               <a:rPr lang="de-DE" smtClean="0"/>
-              <a:t>27.09.15</a:t>
+              <a:t>29.09.15</a:t>
             </a:fld>
             <a:endParaRPr lang="de-DE"/>
           </a:p>
@@ -4024,7 +4161,7 @@
           <a:p>
             <a:fld id="{F1685586-B5EA-E847-B070-B0C7B53D662E}" type="datetimeFigureOut">
               <a:rPr lang="de-DE" smtClean="0"/>
-              <a:t>27.09.15</a:t>
+              <a:t>29.09.15</a:t>
             </a:fld>
             <a:endParaRPr lang="de-DE"/>
           </a:p>
@@ -4256,7 +4393,7 @@
           <a:p>
             <a:fld id="{F1685586-B5EA-E847-B070-B0C7B53D662E}" type="datetimeFigureOut">
               <a:rPr lang="de-DE" smtClean="0"/>
-              <a:t>27.09.15</a:t>
+              <a:t>29.09.15</a:t>
             </a:fld>
             <a:endParaRPr lang="de-DE"/>
           </a:p>
@@ -4623,7 +4760,7 @@
           <a:p>
             <a:fld id="{F1685586-B5EA-E847-B070-B0C7B53D662E}" type="datetimeFigureOut">
               <a:rPr lang="de-DE" smtClean="0"/>
-              <a:t>27.09.15</a:t>
+              <a:t>29.09.15</a:t>
             </a:fld>
             <a:endParaRPr lang="de-DE"/>
           </a:p>
@@ -4741,7 +4878,7 @@
           <a:p>
             <a:fld id="{F1685586-B5EA-E847-B070-B0C7B53D662E}" type="datetimeFigureOut">
               <a:rPr lang="de-DE" smtClean="0"/>
-              <a:t>27.09.15</a:t>
+              <a:t>29.09.15</a:t>
             </a:fld>
             <a:endParaRPr lang="de-DE"/>
           </a:p>
@@ -4836,7 +4973,7 @@
           <a:p>
             <a:fld id="{F1685586-B5EA-E847-B070-B0C7B53D662E}" type="datetimeFigureOut">
               <a:rPr lang="de-DE" smtClean="0"/>
-              <a:t>27.09.15</a:t>
+              <a:t>29.09.15</a:t>
             </a:fld>
             <a:endParaRPr lang="de-DE"/>
           </a:p>
@@ -5113,7 +5250,7 @@
           <a:p>
             <a:fld id="{F1685586-B5EA-E847-B070-B0C7B53D662E}" type="datetimeFigureOut">
               <a:rPr lang="de-DE" smtClean="0"/>
-              <a:t>27.09.15</a:t>
+              <a:t>29.09.15</a:t>
             </a:fld>
             <a:endParaRPr lang="de-DE"/>
           </a:p>
@@ -5366,7 +5503,7 @@
           <a:p>
             <a:fld id="{F1685586-B5EA-E847-B070-B0C7B53D662E}" type="datetimeFigureOut">
               <a:rPr lang="de-DE" smtClean="0"/>
-              <a:t>27.09.15</a:t>
+              <a:t>29.09.15</a:t>
             </a:fld>
             <a:endParaRPr lang="de-DE"/>
           </a:p>
@@ -5579,7 +5716,7 @@
           <a:p>
             <a:fld id="{F1685586-B5EA-E847-B070-B0C7B53D662E}" type="datetimeFigureOut">
               <a:rPr lang="de-DE" smtClean="0"/>
-              <a:t>27.09.15</a:t>
+              <a:t>29.09.15</a:t>
             </a:fld>
             <a:endParaRPr lang="de-DE"/>
           </a:p>
@@ -6131,11 +6268,7 @@
           <a:p>
             <a:r>
               <a:rPr lang="de-DE" dirty="0" smtClean="0"/>
-              <a:t>RGB RGB </a:t>
-            </a:r>
-            <a:r>
-              <a:rPr lang="de-DE" dirty="0" smtClean="0"/>
-              <a:t>...</a:t>
+              <a:t>RGB RGB ...</a:t>
             </a:r>
             <a:br>
               <a:rPr lang="de-DE" dirty="0" smtClean="0"/>
@@ -6160,7 +6293,6 @@
               <a:rPr lang="de-DE" dirty="0" smtClean="0"/>
               <a:t>) in dieser Reihenfolge aus dem Sensor kommen und in dieser Reihenfolge angezeigt werden.</a:t>
             </a:r>
-            <a:endParaRPr lang="de-DE" dirty="0" smtClean="0"/>
           </a:p>
           <a:p>
             <a:r>
@@ -6174,7 +6306,6 @@
               <a:rPr lang="de-DE" dirty="0" smtClean="0"/>
               <a:t>Macht Sinn, wenn Operationen nur auf bestimmten Kanäle operieren, da die Daten dann sehr viele lokaler gespeichert sind.</a:t>
             </a:r>
-            <a:endParaRPr lang="de-DE" dirty="0" smtClean="0"/>
           </a:p>
           <a:p>
             <a:r>
@@ -6196,7 +6327,6 @@
               <a:rPr lang="de-DE" dirty="0" smtClean="0"/>
               <a:t> Operationen notwendig.</a:t>
             </a:r>
-            <a:endParaRPr lang="de-DE" dirty="0" smtClean="0"/>
           </a:p>
           <a:p>
             <a:endParaRPr lang="de-DE" dirty="0" smtClean="0"/>
@@ -6300,7 +6430,6 @@
               <a:rPr lang="de-DE" dirty="0" smtClean="0"/>
               <a:t> Operationen</a:t>
             </a:r>
-            <a:endParaRPr lang="de-DE" dirty="0" smtClean="0"/>
           </a:p>
           <a:p>
             <a:r>
@@ -6416,21 +6545,13 @@
           <a:p>
             <a:r>
               <a:rPr lang="de-DE" dirty="0" smtClean="0"/>
-              <a:t>Es werden mehrere Punkte im Eingabebild mit </a:t>
-            </a:r>
-            <a:r>
-              <a:rPr lang="de-DE" dirty="0" smtClean="0"/>
-              <a:t>Hilfe einer Matrix zu einem Punkt im Ergebnisbild</a:t>
-            </a:r>
-          </a:p>
-          <a:p>
-            <a:r>
-              <a:rPr lang="de-DE" dirty="0" smtClean="0"/>
-              <a:t>Als Beispiel hier die Vierer Nachbarschaft, be</a:t>
-            </a:r>
-            <a:r>
-              <a:rPr lang="de-DE" dirty="0" smtClean="0"/>
-              <a:t>i die vier angrenzenden Punkte in Die Berechnung eingezogen werden und die Achter Nachbarschaft.</a:t>
+              <a:t>Es werden mehrere Punkte im Eingabebild mit Hilfe einer Matrix zu einem Punkt im Ergebnisbild</a:t>
+            </a:r>
+          </a:p>
+          <a:p>
+            <a:r>
+              <a:rPr lang="de-DE" dirty="0" smtClean="0"/>
+              <a:t>Als Beispiel hier die Vierer Nachbarschaft, bei die vier angrenzenden Punkte in Die Berechnung eingezogen werden und die Achter Nachbarschaft.</a:t>
             </a:r>
           </a:p>
           <a:p>
@@ -7039,11 +7160,7 @@
           <a:p>
             <a:r>
               <a:rPr lang="de-DE" dirty="0" smtClean="0"/>
-              <a:t>Weitere </a:t>
-            </a:r>
-            <a:r>
-              <a:rPr lang="de-DE" dirty="0" smtClean="0"/>
-              <a:t>Bibliotheken</a:t>
+              <a:t>Weitere Bibliotheken</a:t>
             </a:r>
             <a:endParaRPr lang="de-DE" dirty="0"/>
           </a:p>
@@ -7264,13 +7381,7 @@
               <a:rPr lang="de-DE" dirty="0" smtClean="0">
                 <a:hlinkClick r:id="rId4"/>
               </a:rPr>
-              <a:t>http://</a:t>
-            </a:r>
-            <a:r>
-              <a:rPr lang="de-DE" dirty="0" smtClean="0">
-                <a:hlinkClick r:id="rId4"/>
-              </a:rPr>
-              <a:t>docs.opencv.org</a:t>
+              <a:t>http://docs.opencv.org</a:t>
             </a:r>
             <a:endParaRPr lang="de-DE" dirty="0" smtClean="0"/>
           </a:p>
@@ -7279,7 +7390,6 @@
               <a:rPr lang="de-DE" dirty="0" smtClean="0"/>
               <a:t>Wikipedia</a:t>
             </a:r>
-            <a:endParaRPr lang="de-DE" dirty="0" smtClean="0"/>
           </a:p>
           <a:p>
             <a:endParaRPr lang="de-DE" dirty="0" smtClean="0"/>
@@ -7424,7 +7534,6 @@
               <a:rPr lang="de-DE" dirty="0" smtClean="0"/>
               <a:t>Links, ...</a:t>
             </a:r>
-            <a:endParaRPr lang="de-DE" dirty="0" smtClean="0"/>
           </a:p>
         </p:txBody>
       </p:sp>
@@ -7559,11 +7668,7 @@
           <a:p>
             <a:r>
               <a:rPr lang="de-DE" dirty="0" smtClean="0"/>
-              <a:t>Bayer </a:t>
-            </a:r>
-            <a:r>
-              <a:rPr lang="de-DE" dirty="0" smtClean="0"/>
-              <a:t>Pattern</a:t>
+              <a:t>Bayer Pattern</a:t>
             </a:r>
             <a:br>
               <a:rPr lang="de-DE" dirty="0" smtClean="0"/>
@@ -7920,7 +8025,6 @@
               <a:rPr lang="de-DE" dirty="0" smtClean="0"/>
               <a:t> auch für Farbangaben im Web verwendet), 10 Bit (Können nicht alle Rechner darstellen), und 565 Bit für die einzelnen Farbanteile.</a:t>
             </a:r>
-            <a:endParaRPr lang="de-DE" dirty="0" smtClean="0"/>
           </a:p>
         </p:txBody>
       </p:sp>
@@ -8042,7 +8146,6 @@
               <a:rPr lang="de-DE" dirty="0" smtClean="0"/>
               <a:t>Hier wird zusätzlich zu den 3 Farbanteilen ein Alpha Channel gespeichert. Dieser bestimmt die Transparenz an den entsprechenden Pixeln des Bildes. Oft in 8 Bit Auflösung, kann aber auch in einem Bit (als Maske) gespeichert/verwendet werden.</a:t>
             </a:r>
-            <a:endParaRPr lang="de-DE" dirty="0" smtClean="0"/>
           </a:p>
           <a:p>
             <a:r>
@@ -8064,7 +8167,6 @@
               <a:rPr lang="de-DE" dirty="0" smtClean="0"/>
               <a:t> nur mit einem Wert pro Pixel.</a:t>
             </a:r>
-            <a:endParaRPr lang="de-DE" dirty="0" smtClean="0"/>
           </a:p>
         </p:txBody>
       </p:sp>

</xml_diff>